<commit_message>
[Kerry] add a simple nginx demo for day-4 docker-compose file
</commit_message>
<xml_diff>
--- a/day-4/ddd-4.pptx
+++ b/day-4/ddd-4.pptx
@@ -311,7 +311,7 @@
           <a:p>
             <a:fld id="{03683205-7DCF-9447-B5AB-22DFE12CC2DE}" type="datetimeFigureOut">
               <a:rPr lang="en-US" smtClean="0"/>
-              <a:t>8/10/16</a:t>
+              <a:t>8/12/16</a:t>
             </a:fld>
             <a:endParaRPr lang="en-US"/>
           </a:p>
@@ -481,7 +481,7 @@
           <a:p>
             <a:fld id="{03683205-7DCF-9447-B5AB-22DFE12CC2DE}" type="datetimeFigureOut">
               <a:rPr lang="en-US" smtClean="0"/>
-              <a:t>8/10/16</a:t>
+              <a:t>8/12/16</a:t>
             </a:fld>
             <a:endParaRPr lang="en-US"/>
           </a:p>
@@ -661,7 +661,7 @@
           <a:p>
             <a:fld id="{03683205-7DCF-9447-B5AB-22DFE12CC2DE}" type="datetimeFigureOut">
               <a:rPr lang="en-US" smtClean="0"/>
-              <a:t>8/10/16</a:t>
+              <a:t>8/12/16</a:t>
             </a:fld>
             <a:endParaRPr lang="en-US"/>
           </a:p>
@@ -831,7 +831,7 @@
           <a:p>
             <a:fld id="{03683205-7DCF-9447-B5AB-22DFE12CC2DE}" type="datetimeFigureOut">
               <a:rPr lang="en-US" smtClean="0"/>
-              <a:t>8/10/16</a:t>
+              <a:t>8/12/16</a:t>
             </a:fld>
             <a:endParaRPr lang="en-US"/>
           </a:p>
@@ -1077,7 +1077,7 @@
           <a:p>
             <a:fld id="{03683205-7DCF-9447-B5AB-22DFE12CC2DE}" type="datetimeFigureOut">
               <a:rPr lang="en-US" smtClean="0"/>
-              <a:t>8/10/16</a:t>
+              <a:t>8/12/16</a:t>
             </a:fld>
             <a:endParaRPr lang="en-US"/>
           </a:p>
@@ -1365,7 +1365,7 @@
           <a:p>
             <a:fld id="{03683205-7DCF-9447-B5AB-22DFE12CC2DE}" type="datetimeFigureOut">
               <a:rPr lang="en-US" smtClean="0"/>
-              <a:t>8/10/16</a:t>
+              <a:t>8/12/16</a:t>
             </a:fld>
             <a:endParaRPr lang="en-US"/>
           </a:p>
@@ -1787,7 +1787,7 @@
           <a:p>
             <a:fld id="{03683205-7DCF-9447-B5AB-22DFE12CC2DE}" type="datetimeFigureOut">
               <a:rPr lang="en-US" smtClean="0"/>
-              <a:t>8/10/16</a:t>
+              <a:t>8/12/16</a:t>
             </a:fld>
             <a:endParaRPr lang="en-US"/>
           </a:p>
@@ -1905,7 +1905,7 @@
           <a:p>
             <a:fld id="{03683205-7DCF-9447-B5AB-22DFE12CC2DE}" type="datetimeFigureOut">
               <a:rPr lang="en-US" smtClean="0"/>
-              <a:t>8/10/16</a:t>
+              <a:t>8/12/16</a:t>
             </a:fld>
             <a:endParaRPr lang="en-US"/>
           </a:p>
@@ -2000,7 +2000,7 @@
           <a:p>
             <a:fld id="{03683205-7DCF-9447-B5AB-22DFE12CC2DE}" type="datetimeFigureOut">
               <a:rPr lang="en-US" smtClean="0"/>
-              <a:t>8/10/16</a:t>
+              <a:t>8/12/16</a:t>
             </a:fld>
             <a:endParaRPr lang="en-US"/>
           </a:p>
@@ -2277,7 +2277,7 @@
           <a:p>
             <a:fld id="{03683205-7DCF-9447-B5AB-22DFE12CC2DE}" type="datetimeFigureOut">
               <a:rPr lang="en-US" smtClean="0"/>
-              <a:t>8/10/16</a:t>
+              <a:t>8/12/16</a:t>
             </a:fld>
             <a:endParaRPr lang="en-US"/>
           </a:p>
@@ -2530,7 +2530,7 @@
           <a:p>
             <a:fld id="{03683205-7DCF-9447-B5AB-22DFE12CC2DE}" type="datetimeFigureOut">
               <a:rPr lang="en-US" smtClean="0"/>
-              <a:t>8/10/16</a:t>
+              <a:t>8/12/16</a:t>
             </a:fld>
             <a:endParaRPr lang="en-US"/>
           </a:p>
@@ -2743,7 +2743,7 @@
           <a:p>
             <a:fld id="{03683205-7DCF-9447-B5AB-22DFE12CC2DE}" type="datetimeFigureOut">
               <a:rPr lang="en-US" smtClean="0"/>
-              <a:t>8/10/16</a:t>
+              <a:t>8/12/16</a:t>
             </a:fld>
             <a:endParaRPr lang="en-US"/>
           </a:p>
@@ -3385,13 +3385,22 @@
           </a:p>
           <a:p>
             <a:r>
+              <a:rPr lang="en-US" dirty="0" err="1"/>
+              <a:t>d</a:t>
+            </a:r>
+            <a:r>
               <a:rPr lang="en-US" dirty="0" err="1" smtClean="0"/>
-              <a:t>Docker</a:t>
+              <a:t>ocker</a:t>
             </a:r>
             <a:r>
               <a:rPr lang="en-US" dirty="0" smtClean="0"/>
-              <a:t> compose show case</a:t>
-            </a:r>
+              <a:t>-</a:t>
+            </a:r>
+            <a:r>
+              <a:rPr lang="en-US" dirty="0" smtClean="0"/>
+              <a:t>compose debug &amp; basic commands </a:t>
+            </a:r>
+            <a:endParaRPr lang="en-US" dirty="0" smtClean="0"/>
           </a:p>
           <a:p>
             <a:endParaRPr lang="en-US" dirty="0" smtClean="0"/>
@@ -3536,12 +3545,8 @@
           <a:lstStyle/>
           <a:p>
             <a:r>
-              <a:rPr lang="en-US" dirty="0" err="1" smtClean="0"/>
-              <a:t>Docker</a:t>
-            </a:r>
-            <a:r>
               <a:rPr lang="en-US" dirty="0" smtClean="0"/>
-              <a:t> Demo</a:t>
+              <a:t>Compose Demo</a:t>
             </a:r>
             <a:endParaRPr lang="en-US" dirty="0"/>
           </a:p>
@@ -3656,7 +3661,7 @@
             </a:pPr>
             <a:r>
               <a:rPr lang="en-US" dirty="0" smtClean="0"/>
-              <a:t>Build your own images with a </a:t>
+              <a:t>Build your own images with </a:t>
             </a:r>
             <a:r>
               <a:rPr lang="en-US" dirty="0" err="1" smtClean="0">
@@ -3664,7 +3669,23 @@
                   <a:srgbClr val="FF0000"/>
                 </a:solidFill>
               </a:rPr>
-              <a:t>Dockerfile</a:t>
+              <a:t>d</a:t>
+            </a:r>
+            <a:r>
+              <a:rPr lang="en-US" dirty="0" err="1" smtClean="0">
+                <a:solidFill>
+                  <a:srgbClr val="FF0000"/>
+                </a:solidFill>
+              </a:rPr>
+              <a:t>ocker</a:t>
+            </a:r>
+            <a:r>
+              <a:rPr lang="en-US" dirty="0" smtClean="0">
+                <a:solidFill>
+                  <a:srgbClr val="FF0000"/>
+                </a:solidFill>
+              </a:rPr>
+              <a:t>-compose</a:t>
             </a:r>
             <a:endParaRPr lang="en-US" dirty="0" smtClean="0">
               <a:solidFill>
@@ -3739,11 +3760,6 @@
               </a:rPr>
               <a:t> </a:t>
             </a:r>
-            <a:endParaRPr lang="en-US" dirty="0">
-              <a:solidFill>
-                <a:srgbClr val="FF0000"/>
-              </a:solidFill>
-            </a:endParaRPr>
           </a:p>
           <a:p>
             <a:r>
@@ -3776,21 +3792,8 @@
                   <a:srgbClr val="FF0000"/>
                 </a:solidFill>
               </a:rPr>
-              <a:t>stop </a:t>
-            </a:r>
-            <a:r>
-              <a:rPr lang="en-US" dirty="0" smtClean="0">
-                <a:solidFill>
-                  <a:srgbClr val="FF0000"/>
-                </a:solidFill>
-              </a:rPr>
-              <a:t>name</a:t>
-            </a:r>
-            <a:endParaRPr lang="en-US" dirty="0" smtClean="0">
-              <a:solidFill>
-                <a:srgbClr val="FF0000"/>
-              </a:solidFill>
-            </a:endParaRPr>
+              <a:t>stop name</a:t>
+            </a:r>
           </a:p>
           <a:p>
             <a:r>
@@ -3815,15 +3818,7 @@
                   <a:srgbClr val="FF0000"/>
                 </a:solidFill>
               </a:rPr>
-              <a:t>-compose up –d </a:t>
-            </a:r>
-            <a:r>
-              <a:rPr lang="en-US" dirty="0" smtClean="0">
-                <a:solidFill>
-                  <a:srgbClr val="FF0000"/>
-                </a:solidFill>
-              </a:rPr>
-              <a:t>name</a:t>
+              <a:t>-compose up –d name</a:t>
             </a:r>
           </a:p>
           <a:p>
@@ -3987,7 +3982,19 @@
           <a:p>
             <a:r>
               <a:rPr lang="en-US" dirty="0" smtClean="0"/>
-              <a:t>Give a session for the team (Invite me please)</a:t>
+              <a:t>Give a session for </a:t>
+            </a:r>
+            <a:r>
+              <a:rPr lang="en-US" dirty="0" smtClean="0"/>
+              <a:t>your</a:t>
+            </a:r>
+            <a:r>
+              <a:rPr lang="en-US" dirty="0" smtClean="0"/>
+              <a:t> </a:t>
+            </a:r>
+            <a:r>
+              <a:rPr lang="en-US" dirty="0" smtClean="0"/>
+              <a:t>team (Invite me please)</a:t>
             </a:r>
           </a:p>
         </p:txBody>

</xml_diff>